<commit_message>
adding semvar comment, as suggested by @cosden
</commit_message>
<xml_diff>
--- a/Computational_Reproducibility.pptx
+++ b/Computational_Reproducibility.pptx
@@ -238,7 +238,7 @@
           <a:p>
             <a:fld id="{81C38738-6EB7-A34B-945D-F5A341E4EF53}" type="datetimeFigureOut">
               <a:rPr lang="en-US" smtClean="0"/>
-              <a:t>7/24/20</a:t>
+              <a:t>7/31/20</a:t>
             </a:fld>
             <a:endParaRPr lang="en-US"/>
           </a:p>
@@ -2395,13 +2395,13 @@
         </p:nvSpPr>
         <p:spPr>
           <a:xfrm>
-            <a:off x="386079" y="1198244"/>
-            <a:ext cx="7566119" cy="4572636"/>
+            <a:off x="386079" y="1023585"/>
+            <a:ext cx="7566119" cy="4859260"/>
           </a:xfrm>
         </p:spPr>
         <p:txBody>
           <a:bodyPr>
-            <a:normAutofit fontScale="92500" lnSpcReduction="10000"/>
+            <a:normAutofit fontScale="85000" lnSpcReduction="10000"/>
           </a:bodyPr>
           <a:lstStyle/>
           <a:p>
@@ -2471,6 +2471,64 @@
             <a:r>
               <a:rPr lang="en-US" dirty="0"/>
               <a:t>”</a:t>
+            </a:r>
+          </a:p>
+          <a:p>
+            <a:pPr marL="914400" lvl="1" indent="-514350"/>
+            <a:r>
+              <a:rPr lang="en-US" dirty="0"/>
+              <a:t>Version numbers</a:t>
+            </a:r>
+          </a:p>
+          <a:p>
+            <a:pPr marL="1314450" lvl="2" indent="-514350"/>
+            <a:r>
+              <a:rPr lang="en-US" dirty="0"/>
+              <a:t>Consider releases, use </a:t>
+            </a:r>
+            <a:r>
+              <a:rPr lang="en-US" dirty="0">
+                <a:hlinkClick r:id="rId3"/>
+              </a:rPr>
+              <a:t>semantic versioning</a:t>
+            </a:r>
+            <a:r>
+              <a:rPr lang="en-US" dirty="0"/>
+              <a:t> </a:t>
+            </a:r>
+          </a:p>
+          <a:p>
+            <a:pPr marL="1771650" lvl="3" indent="-514350"/>
+            <a:r>
+              <a:rPr lang="en-US" dirty="0"/>
+              <a:t>A release is a tagged version</a:t>
+            </a:r>
+          </a:p>
+          <a:p>
+            <a:pPr marL="1771650" lvl="3" indent="-514350"/>
+            <a:r>
+              <a:rPr lang="en-US" dirty="0" err="1"/>
+              <a:t>major.minor.patch</a:t>
+            </a:r>
+            <a:r>
+              <a:rPr lang="en-US" dirty="0"/>
+              <a:t> (API-</a:t>
+            </a:r>
+            <a:r>
+              <a:rPr lang="en-US" dirty="0" err="1"/>
+              <a:t>breaking.API</a:t>
+            </a:r>
+            <a:r>
+              <a:rPr lang="en-US" dirty="0"/>
+              <a:t>-</a:t>
+            </a:r>
+            <a:r>
+              <a:rPr lang="en-US" dirty="0" err="1"/>
+              <a:t>maintaining.bug</a:t>
+            </a:r>
+            <a:r>
+              <a:rPr lang="en-US" dirty="0"/>
+              <a:t>-fixes)</a:t>
             </a:r>
           </a:p>
         </p:txBody>
@@ -2490,7 +2548,7 @@
           <p:nvPr/>
         </p:nvPicPr>
         <p:blipFill>
-          <a:blip r:embed="rId3"/>
+          <a:blip r:embed="rId4"/>
           <a:stretch>
             <a:fillRect/>
           </a:stretch>

</xml_diff>

<commit_message>
updating slides with link to repo
</commit_message>
<xml_diff>
--- a/Computational_Reproducibility.pptx
+++ b/Computational_Reproducibility.pptx
@@ -238,7 +238,7 @@
           <a:p>
             <a:fld id="{81C38738-6EB7-A34B-945D-F5A341E4EF53}" type="datetimeFigureOut">
               <a:rPr lang="en-US" smtClean="0"/>
-              <a:t>7/31/20</a:t>
+              <a:t>8/12/20</a:t>
             </a:fld>
             <a:endParaRPr lang="en-US"/>
           </a:p>
@@ -2251,23 +2251,7 @@
                 <a:ea typeface="Georgia" charset="0"/>
                 <a:cs typeface="Georgia" charset="0"/>
               </a:rPr>
-              <a:t>(Research Reproducibility in Theory and Practice, </a:t>
-            </a:r>
-            <a:r>
-              <a:rPr lang="en-US">
-                <a:latin typeface="Georgia" charset="0"/>
-                <a:ea typeface="Georgia" charset="0"/>
-                <a:cs typeface="Georgia" charset="0"/>
-              </a:rPr>
-              <a:t>Day 3, </a:t>
-            </a:r>
-            <a:r>
-              <a:rPr lang="en-US" dirty="0">
-                <a:latin typeface="Georgia" charset="0"/>
-                <a:ea typeface="Georgia" charset="0"/>
-                <a:cs typeface="Georgia" charset="0"/>
-              </a:rPr>
-              <a:t>FSCI2020)</a:t>
+              <a:t>(Research Reproducibility in Theory and Practice, Day 3, FSCI2020)</a:t>
             </a:r>
           </a:p>
         </p:txBody>
@@ -2331,6 +2315,73 @@
               <a:latin typeface="Calibri" charset="0"/>
               <a:ea typeface="Calibri" charset="0"/>
               <a:cs typeface="Calibri" charset="0"/>
+            </a:endParaRPr>
+          </a:p>
+        </p:txBody>
+      </p:sp>
+      <p:sp>
+        <p:nvSpPr>
+          <p:cNvPr id="2" name="Rectangle 1">
+            <a:extLst>
+              <a:ext uri="{FF2B5EF4-FFF2-40B4-BE49-F238E27FC236}">
+                <a16:creationId xmlns:a16="http://schemas.microsoft.com/office/drawing/2014/main" id="{6D63FC56-2B15-DA46-A4F2-760E588F6587}"/>
+              </a:ext>
+            </a:extLst>
+          </p:cNvPr>
+          <p:cNvSpPr/>
+          <p:nvPr/>
+        </p:nvSpPr>
+        <p:spPr>
+          <a:xfrm>
+            <a:off x="1335640" y="4788823"/>
+            <a:ext cx="7423827" cy="461665"/>
+          </a:xfrm>
+          <a:prstGeom prst="rect">
+            <a:avLst/>
+          </a:prstGeom>
+        </p:spPr>
+        <p:txBody>
+          <a:bodyPr wrap="none">
+            <a:spAutoFit/>
+          </a:bodyPr>
+          <a:lstStyle/>
+          <a:p>
+            <a:r>
+              <a:rPr lang="en-US" sz="2400" dirty="0">
+                <a:solidFill>
+                  <a:schemeClr val="bg1"/>
+                </a:solidFill>
+              </a:rPr>
+              <a:t>Slides and examples are in https://</a:t>
+            </a:r>
+            <a:r>
+              <a:rPr lang="en-US" sz="2400" dirty="0" err="1">
+                <a:solidFill>
+                  <a:schemeClr val="bg1"/>
+                </a:solidFill>
+              </a:rPr>
+              <a:t>bit.ly</a:t>
+            </a:r>
+            <a:r>
+              <a:rPr lang="en-US" sz="2400" dirty="0">
+                <a:solidFill>
+                  <a:schemeClr val="bg1"/>
+                </a:solidFill>
+              </a:rPr>
+              <a:t>/</a:t>
+            </a:r>
+            <a:r>
+              <a:rPr lang="en-US" sz="2400" dirty="0" err="1">
+                <a:solidFill>
+                  <a:schemeClr val="bg1"/>
+                </a:solidFill>
+              </a:rPr>
+              <a:t>CompRepro</a:t>
+            </a:r>
+            <a:endParaRPr lang="en-US" sz="2400" dirty="0">
+              <a:solidFill>
+                <a:schemeClr val="bg1"/>
+              </a:solidFill>
             </a:endParaRPr>
           </a:p>
         </p:txBody>

</xml_diff>

<commit_message>
updating to fix errors that I found during talk
</commit_message>
<xml_diff>
--- a/Computational_Reproducibility.pptx
+++ b/Computational_Reproducibility.pptx
@@ -2505,7 +2505,7 @@
         </p:spPr>
         <p:txBody>
           <a:bodyPr>
-            <a:normAutofit fontScale="92500"/>
+            <a:normAutofit fontScale="92500" lnSpcReduction="10000"/>
           </a:bodyPr>
           <a:lstStyle/>
           <a:p>
@@ -2560,36 +2560,52 @@
             <a:pPr lvl="1"/>
             <a:r>
               <a:rPr lang="en-US" dirty="0"/>
-              <a:t>Get it via: </a:t>
-            </a:r>
-            <a:r>
-              <a:rPr lang="en-US" dirty="0" err="1">
+              <a:t>Get it via</a:t>
+            </a:r>
+          </a:p>
+          <a:p>
+            <a:pPr marL="914400" lvl="2" indent="0">
+              <a:buNone/>
+            </a:pPr>
+            <a:r>
+              <a:rPr lang="en-US" sz="1700" dirty="0" err="1">
                 <a:latin typeface="Consolas" panose="020B0609020204030204" pitchFamily="49" charset="0"/>
                 <a:cs typeface="Consolas" panose="020B0609020204030204" pitchFamily="49" charset="0"/>
               </a:rPr>
               <a:t>wget</a:t>
             </a:r>
             <a:r>
-              <a:rPr lang="en-US" dirty="0">
+              <a:rPr lang="en-US" sz="1700" dirty="0">
                 <a:latin typeface="Consolas" panose="020B0609020204030204" pitchFamily="49" charset="0"/>
                 <a:cs typeface="Consolas" panose="020B0609020204030204" pitchFamily="49" charset="0"/>
               </a:rPr>
               <a:t> https://</a:t>
             </a:r>
             <a:r>
-              <a:rPr lang="en-US" dirty="0" err="1">
+              <a:rPr lang="en-US" sz="1700" dirty="0" err="1">
                 <a:latin typeface="Consolas" panose="020B0609020204030204" pitchFamily="49" charset="0"/>
                 <a:cs typeface="Consolas" panose="020B0609020204030204" pitchFamily="49" charset="0"/>
               </a:rPr>
               <a:t>osf.io</a:t>
             </a:r>
             <a:r>
-              <a:rPr lang="en-US" dirty="0">
-                <a:latin typeface="Consolas" panose="020B0609020204030204" pitchFamily="49" charset="0"/>
-                <a:cs typeface="Consolas" panose="020B0609020204030204" pitchFamily="49" charset="0"/>
-              </a:rPr>
-              <a:t>/z274d/download</a:t>
-            </a:r>
+              <a:rPr lang="en-US" sz="1700" dirty="0">
+                <a:latin typeface="Consolas" panose="020B0609020204030204" pitchFamily="49" charset="0"/>
+                <a:cs typeface="Consolas" panose="020B0609020204030204" pitchFamily="49" charset="0"/>
+              </a:rPr>
+              <a:t>/z274d/download -O </a:t>
+            </a:r>
+            <a:r>
+              <a:rPr lang="en-US" sz="1700" dirty="0" err="1">
+                <a:latin typeface="Consolas" panose="020B0609020204030204" pitchFamily="49" charset="0"/>
+                <a:cs typeface="Consolas" panose="020B0609020204030204" pitchFamily="49" charset="0"/>
+              </a:rPr>
+              <a:t>gapminder_copy.txt</a:t>
+            </a:r>
+            <a:endParaRPr lang="en-US" sz="1700" dirty="0">
+              <a:latin typeface="Consolas" panose="020B0609020204030204" pitchFamily="49" charset="0"/>
+              <a:cs typeface="Consolas" panose="020B0609020204030204" pitchFamily="49" charset="0"/>
+            </a:endParaRPr>
           </a:p>
           <a:p>
             <a:pPr marL="914400" lvl="2" indent="0">
@@ -3416,7 +3432,7 @@
                 <a:latin typeface="Consolas" panose="020B0609020204030204" pitchFamily="49" charset="0"/>
                 <a:cs typeface="Consolas" panose="020B0609020204030204" pitchFamily="49" charset="0"/>
               </a:rPr>
-              <a:t>/v3.0/0000-0001-5934-7525’, </a:t>
+              <a:t>/v3.0/0000-0001-5934-7525', </a:t>
             </a:r>
             <a:br>
               <a:rPr lang="en-US" sz="1400" dirty="0">
@@ -11153,7 +11169,7 @@
             </a:pPr>
             <a:r>
               <a:rPr lang="en-US" dirty="0"/>
-              <a:t>Organize and analyze large data sets to learn from them</a:t>
+              <a:t>Organize and analyze large (or small) data sets to learn from them</a:t>
             </a:r>
           </a:p>
           <a:p>
@@ -11263,7 +11279,7 @@
             </a:pPr>
             <a:r>
               <a:rPr lang="en-US" dirty="0"/>
-              <a:t>Relevant: statistics, preregistration (declare your hypothesis before doing your analysis), random studies, false positives/negatives, sample size, confidence</a:t>
+              <a:t>Relevant: statistics, preregistration (declare your hypothesis before doing your analysis), random studies, false positives/negatives, sample size, confidence, power</a:t>
             </a:r>
           </a:p>
           <a:p>

</xml_diff>

<commit_message>
adding cc-by license to slides
</commit_message>
<xml_diff>
--- a/Computational_Reproducibility.pptx
+++ b/Computational_Reproducibility.pptx
@@ -239,7 +239,7 @@
           <a:p>
             <a:fld id="{81C38738-6EB7-A34B-945D-F5A341E4EF53}" type="datetimeFigureOut">
               <a:rPr lang="en-US" smtClean="0"/>
-              <a:t>8/12/20</a:t>
+              <a:t>8/13/20</a:t>
             </a:fld>
             <a:endParaRPr lang="en-US"/>
           </a:p>
@@ -2423,6 +2423,36 @@
           </a:p>
         </p:txBody>
       </p:sp>
+      <p:pic>
+        <p:nvPicPr>
+          <p:cNvPr id="6" name="Picture 5" descr="A drawing of a face&#10;&#10;Description automatically generated">
+            <a:extLst>
+              <a:ext uri="{FF2B5EF4-FFF2-40B4-BE49-F238E27FC236}">
+                <a16:creationId xmlns:a16="http://schemas.microsoft.com/office/drawing/2014/main" id="{4B1874BD-3556-814A-8A61-6669DC4C1548}"/>
+              </a:ext>
+            </a:extLst>
+          </p:cNvPr>
+          <p:cNvPicPr>
+            <a:picLocks noChangeAspect="1"/>
+          </p:cNvPicPr>
+          <p:nvPr/>
+        </p:nvPicPr>
+        <p:blipFill>
+          <a:blip r:embed="rId3"/>
+          <a:stretch>
+            <a:fillRect/>
+          </a:stretch>
+        </p:blipFill>
+        <p:spPr>
+          <a:xfrm>
+            <a:off x="10754359" y="6281149"/>
+            <a:ext cx="1219200" cy="419100"/>
+          </a:xfrm>
+          <a:prstGeom prst="rect">
+            <a:avLst/>
+          </a:prstGeom>
+        </p:spPr>
+      </p:pic>
     </p:spTree>
     <p:extLst>
       <p:ext uri="{BB962C8B-B14F-4D97-AF65-F5344CB8AC3E}">

</xml_diff>

<commit_message>
new versions of slides for FSCI2021
</commit_message>
<xml_diff>
--- a/Computational_Reproducibility.pptx
+++ b/Computational_Reproducibility.pptx
@@ -239,7 +239,7 @@
           <a:p>
             <a:fld id="{81C38738-6EB7-A34B-945D-F5A341E4EF53}" type="datetimeFigureOut">
               <a:rPr lang="en-US" smtClean="0"/>
-              <a:t>8/13/20</a:t>
+              <a:t>7/23/21</a:t>
             </a:fld>
             <a:endParaRPr lang="en-US"/>
           </a:p>
@@ -2252,7 +2252,7 @@
                 <a:ea typeface="Georgia" charset="0"/>
                 <a:cs typeface="Georgia" charset="0"/>
               </a:rPr>
-              <a:t>(Research Reproducibility in Theory and Practice, Day 3, FSCI2020)</a:t>
+              <a:t>(Research Reproducibility in Theory and Practice, Day 3, FSCI2021)</a:t>
             </a:r>
           </a:p>
         </p:txBody>
@@ -5503,7 +5503,7 @@
               <a:rPr lang="en-US" dirty="0">
                 <a:hlinkClick r:id="rId5"/>
               </a:rPr>
-              <a:t>Treebeard</a:t>
+              <a:t>nbmake-action</a:t>
             </a:r>
             <a:r>
               <a:rPr lang="en-US" dirty="0"/>
@@ -5514,46 +5514,22 @@
             <a:pPr marL="1314450" lvl="2" indent="-514350"/>
             <a:r>
               <a:rPr lang="en-US" dirty="0"/>
-              <a:t>A library which helps Python Data Science practitioners work more productively with cloud environments.</a:t>
+              <a:t>A GitHub Action for testing notebooks, runs them from top-to-bottom</a:t>
             </a:r>
           </a:p>
           <a:p>
             <a:pPr marL="1314450" lvl="2" indent="-514350"/>
             <a:r>
               <a:rPr lang="en-US" dirty="0"/>
-              <a:t>Runs on GitHub Actions</a:t>
+              <a:t>Intended to raise the quality of scientific material through better automation</a:t>
             </a:r>
           </a:p>
           <a:p>
             <a:pPr marL="1314450" lvl="2" indent="-514350"/>
             <a:r>
               <a:rPr lang="en-US" dirty="0"/>
-              <a:t>Automatically Containerizes Repos</a:t>
-            </a:r>
-          </a:p>
-          <a:p>
-            <a:pPr marL="1314450" lvl="2" indent="-514350"/>
-            <a:r>
-              <a:rPr lang="en-US" dirty="0"/>
-              <a:t>Executes Notebooks</a:t>
-            </a:r>
-          </a:p>
-          <a:p>
-            <a:pPr marL="1314450" lvl="2" indent="-514350"/>
-            <a:r>
-              <a:rPr lang="en-US" dirty="0"/>
-              <a:t>Searches for missing imports</a:t>
-            </a:r>
-          </a:p>
-          <a:p>
-            <a:pPr marL="0" indent="0">
-              <a:buNone/>
-            </a:pPr>
-            <a:endParaRPr lang="en-US" dirty="0"/>
-          </a:p>
-          <a:p>
-            <a:pPr marL="914400" lvl="1" indent="-514350"/>
-            <a:endParaRPr lang="en-US" dirty="0"/>
+              <a:t>For scientists/developers who have written docs in notebooks and want to CI test them after every commit</a:t>
+            </a:r>
           </a:p>
         </p:txBody>
       </p:sp>
@@ -6448,7 +6424,7 @@
             </a:br>
             <a:r>
               <a:rPr lang="en-US" dirty="0"/>
-              <a:t>languages, e.g. in bioinformatics, </a:t>
+              <a:t>languages, e.g., in bioinformatics, </a:t>
             </a:r>
             <a:r>
               <a:rPr lang="en-US" dirty="0" err="1"/>
@@ -6493,7 +6469,7 @@
             </a:r>
             <a:r>
               <a:rPr lang="en-US" dirty="0"/>
-              <a:t> with 284 examples)</a:t>
+              <a:t> with 298 examples)</a:t>
             </a:r>
           </a:p>
           <a:p>
@@ -7906,7 +7882,7 @@
                 <a:latin typeface="Consolas" panose="020B0609020204030204" pitchFamily="49" charset="0"/>
                 <a:cs typeface="Consolas" panose="020B0609020204030204" pitchFamily="49" charset="0"/>
               </a:rPr>
-              <a:t>$(PROC_FILES): $(@:proc/%_</a:t>
+              <a:t>proc/%_</a:t>
             </a:r>
             <a:r>
               <a:rPr lang="en-US" dirty="0" err="1">
@@ -7920,7 +7896,7 @@
                 <a:latin typeface="Consolas" panose="020B0609020204030204" pitchFamily="49" charset="0"/>
                 <a:cs typeface="Consolas" panose="020B0609020204030204" pitchFamily="49" charset="0"/>
               </a:rPr>
-              <a:t>=raw/%.jpg) $(SHARPEN) | proc</a:t>
+              <a:t>: raw/%.jpg $(SHARPEN) | proc</a:t>
             </a:r>
           </a:p>
           <a:p>
@@ -8012,8 +7988,8 @@
         </p:nvSpPr>
         <p:spPr>
           <a:xfrm>
-            <a:off x="5705584" y="2476072"/>
-            <a:ext cx="5780654" cy="1365436"/>
+            <a:off x="5705584" y="2476071"/>
+            <a:ext cx="5780654" cy="1859623"/>
           </a:xfrm>
           <a:prstGeom prst="roundRect">
             <a:avLst/>
@@ -8043,6 +8019,25 @@
         <p:txBody>
           <a:bodyPr rtlCol="0" anchor="ctr"/>
           <a:lstStyle/>
+          <a:p>
+            <a:pPr algn="ctr"/>
+            <a:r>
+              <a:rPr lang="en-US" dirty="0">
+                <a:solidFill>
+                  <a:srgbClr val="00B0F0"/>
+                </a:solidFill>
+              </a:rPr>
+              <a:t>And make the automation as general as possible</a:t>
+            </a:r>
+          </a:p>
+          <a:p>
+            <a:pPr algn="ctr"/>
+            <a:endParaRPr lang="en-US" dirty="0">
+              <a:solidFill>
+                <a:srgbClr val="00B0F0"/>
+              </a:solidFill>
+            </a:endParaRPr>
+          </a:p>
           <a:p>
             <a:pPr algn="ctr"/>
             <a:r>
@@ -8344,7 +8339,7 @@
             </a:r>
             <a:r>
               <a:rPr lang="en-US" sz="2400" dirty="0"/>
-              <a:t>” for a recent survey of 11</a:t>
+              <a:t>” for a 2020 survey of 11</a:t>
             </a:r>
           </a:p>
         </p:txBody>
@@ -9246,7 +9241,7 @@
               <a:rPr lang="en-US" sz="2400" dirty="0">
                 <a:hlinkClick r:id="rId3"/>
               </a:rPr>
-              <a:t>choosealicense.org</a:t>
+              <a:t>choosealicense.com</a:t>
             </a:r>
             <a:r>
               <a:rPr lang="en-US" sz="2400" dirty="0"/>
@@ -9449,7 +9444,7 @@
               <a:rPr lang="en-US" sz="2000" dirty="0">
                 <a:hlinkClick r:id="rId3"/>
               </a:rPr>
-              <a:t>https://guides.github.com/activities/citable-code/</a:t>
+              <a:t>guides.github.com/activities/citable-code</a:t>
             </a:r>
             <a:r>
               <a:rPr lang="en-US" sz="2000" dirty="0"/>
@@ -9504,17 +9499,12 @@
               <a:rPr lang="en-US" sz="2000" dirty="0">
                 <a:hlinkClick r:id="rId4"/>
               </a:rPr>
-              <a:t>https://research-software.org/citation/</a:t>
+              <a:t>cite.research-software.org</a:t>
             </a:r>
             <a:r>
               <a:rPr lang="en-US" sz="2000" dirty="0"/>
-              <a:t> </a:t>
-            </a:r>
-            <a:r>
-              <a:rPr lang="en-US" sz="2000"/>
-              <a:t>for more</a:t>
-            </a:r>
-            <a:endParaRPr lang="en-US" sz="2000" dirty="0"/>
+              <a:t> for more</a:t>
+            </a:r>
           </a:p>
         </p:txBody>
       </p:sp>
@@ -9917,7 +9907,9 @@
         </p:nvSpPr>
         <p:spPr/>
         <p:txBody>
-          <a:bodyPr/>
+          <a:bodyPr>
+            <a:normAutofit lnSpcReduction="10000"/>
+          </a:bodyPr>
           <a:lstStyle/>
           <a:p>
             <a:r>
@@ -9975,6 +9967,17 @@
             <a:r>
               <a:rPr lang="en-US" dirty="0"/>
               <a:t>Close enough (you decide what this means), not necessarily all the bits</a:t>
+            </a:r>
+          </a:p>
+          <a:p>
+            <a:pPr lvl="1"/>
+            <a:r>
+              <a:rPr lang="en-US"/>
+              <a:t>Plausible vs. </a:t>
+            </a:r>
+            <a:r>
+              <a:rPr lang="en-US" dirty="0"/>
+              <a:t>practical</a:t>
             </a:r>
           </a:p>
         </p:txBody>
@@ -10201,7 +10204,7 @@
               <a:rPr lang="en-US" dirty="0">
                 <a:hlinkClick r:id="rId8"/>
               </a:rPr>
-              <a:t>https://www.practicereproducibleresearch.org/</a:t>
+              <a:t>http://www.practicereproducibleresearch.org/</a:t>
             </a:r>
             <a:endParaRPr lang="en-US" dirty="0"/>
           </a:p>
@@ -10713,7 +10716,7 @@
         <p:spPr>
           <a:xfrm>
             <a:off x="386080" y="1198244"/>
-            <a:ext cx="11399520" cy="1298376"/>
+            <a:ext cx="11399520" cy="1442214"/>
           </a:xfrm>
         </p:spPr>
         <p:txBody>
@@ -10761,6 +10764,17 @@
             <a:r>
               <a:rPr lang="en-US" dirty="0"/>
               <a:t> for some discussion</a:t>
+            </a:r>
+          </a:p>
+          <a:p>
+            <a:pPr>
+              <a:lnSpc>
+                <a:spcPct val="120000"/>
+              </a:lnSpc>
+            </a:pPr>
+            <a:r>
+              <a:rPr lang="en-US" dirty="0"/>
+              <a:t>Maybe these are getting to be more standardized?  But still, define what you mean!</a:t>
             </a:r>
           </a:p>
           <a:p>
@@ -10783,14 +10797,14 @@
           <p:nvPr>
             <p:extLst>
               <p:ext uri="{D42A27DB-BD31-4B8C-83A1-F6EECF244321}">
-                <p14:modId xmlns:p14="http://schemas.microsoft.com/office/powerpoint/2010/main" val="4293560274"/>
+                <p14:modId xmlns:p14="http://schemas.microsoft.com/office/powerpoint/2010/main" val="556358338"/>
               </p:ext>
             </p:extLst>
           </p:nvPr>
         </p:nvGraphicFramePr>
         <p:xfrm>
-          <a:off x="1510301" y="2663077"/>
-          <a:ext cx="8882369" cy="2286000"/>
+          <a:off x="406400" y="2743196"/>
+          <a:ext cx="11511622" cy="2286000"/>
         </p:xfrm>
         <a:graphic>
           <a:graphicData uri="http://schemas.openxmlformats.org/drawingml/2006/table">
@@ -10799,24 +10813,31 @@
                 <a:tableStyleId>{5C22544A-7EE6-4342-B048-85BDC9FD1C3A}</a:tableStyleId>
               </a:tblPr>
               <a:tblGrid>
-                <a:gridCol w="3859382">
+                <a:gridCol w="3948644">
                   <a:extLst>
                     <a:ext uri="{9D8B030D-6E8A-4147-A177-3AD203B41FA5}">
                       <a16:colId xmlns:a16="http://schemas.microsoft.com/office/drawing/2014/main" val="1170921038"/>
                     </a:ext>
                   </a:extLst>
                 </a:gridCol>
-                <a:gridCol w="2653963">
+                <a:gridCol w="2715346">
                   <a:extLst>
                     <a:ext uri="{9D8B030D-6E8A-4147-A177-3AD203B41FA5}">
                       <a16:colId xmlns:a16="http://schemas.microsoft.com/office/drawing/2014/main" val="1773268317"/>
                     </a:ext>
                   </a:extLst>
                 </a:gridCol>
-                <a:gridCol w="2369024">
+                <a:gridCol w="2423816">
                   <a:extLst>
                     <a:ext uri="{9D8B030D-6E8A-4147-A177-3AD203B41FA5}">
                       <a16:colId xmlns:a16="http://schemas.microsoft.com/office/drawing/2014/main" val="1325153906"/>
+                    </a:ext>
+                  </a:extLst>
+                </a:gridCol>
+                <a:gridCol w="2423816">
+                  <a:extLst>
+                    <a:ext uri="{9D8B030D-6E8A-4147-A177-3AD203B41FA5}">
+                      <a16:colId xmlns:a16="http://schemas.microsoft.com/office/drawing/2014/main" val="311738123"/>
                     </a:ext>
                   </a:extLst>
                 </a:gridCol>
@@ -10856,7 +10877,20 @@
                     <a:p>
                       <a:r>
                         <a:rPr lang="en-US" sz="2400" dirty="0"/>
-                        <a:t>ACM</a:t>
+                        <a:t>ACM (2020+)</a:t>
+                      </a:r>
+                    </a:p>
+                  </a:txBody>
+                  <a:tcPr/>
+                </a:tc>
+                <a:tc>
+                  <a:txBody>
+                    <a:bodyPr/>
+                    <a:lstStyle/>
+                    <a:p>
+                      <a:r>
+                        <a:rPr lang="en-US" sz="2400" dirty="0"/>
+                        <a:t>AMC (2020-)</a:t>
                       </a:r>
                     </a:p>
                   </a:txBody>
@@ -10902,6 +10936,19 @@
                   </a:txBody>
                   <a:tcPr/>
                 </a:tc>
+                <a:tc>
+                  <a:txBody>
+                    <a:bodyPr/>
+                    <a:lstStyle/>
+                    <a:p>
+                      <a:r>
+                        <a:rPr lang="en-US" sz="2400" dirty="0"/>
+                        <a:t>Repeatability</a:t>
+                      </a:r>
+                    </a:p>
+                  </a:txBody>
+                  <a:tcPr/>
+                </a:tc>
                 <a:extLst>
                   <a:ext uri="{0D108BD9-81ED-4DB2-BD59-A6C34878D82A}">
                     <a16:rowId xmlns:a16="http://schemas.microsoft.com/office/drawing/2014/main" val="304314826"/>
@@ -10917,6 +10964,19 @@
                       <a:r>
                         <a:rPr lang="en-US" sz="2400" dirty="0"/>
                         <a:t>Methods Reproducibility</a:t>
+                      </a:r>
+                    </a:p>
+                  </a:txBody>
+                  <a:tcPr/>
+                </a:tc>
+                <a:tc>
+                  <a:txBody>
+                    <a:bodyPr/>
+                    <a:lstStyle/>
+                    <a:p>
+                      <a:r>
+                        <a:rPr lang="en-US" sz="2400" dirty="0"/>
+                        <a:t>Reproducibility</a:t>
                       </a:r>
                     </a:p>
                   </a:txBody>
@@ -10988,6 +11048,19 @@
                     <a:p>
                       <a:r>
                         <a:rPr lang="en-US" sz="2400" dirty="0"/>
+                        <a:t>Replicability</a:t>
+                      </a:r>
+                    </a:p>
+                  </a:txBody>
+                  <a:tcPr/>
+                </a:tc>
+                <a:tc>
+                  <a:txBody>
+                    <a:bodyPr/>
+                    <a:lstStyle/>
+                    <a:p>
+                      <a:r>
+                        <a:rPr lang="en-US" sz="2400" dirty="0"/>
                         <a:t>Reproducibility</a:t>
                       </a:r>
                     </a:p>
@@ -11020,6 +11093,16 @@
                     <a:lstStyle/>
                     <a:p>
                       <a:endParaRPr lang="en-US" sz="2400"/>
+                    </a:p>
+                  </a:txBody>
+                  <a:tcPr/>
+                </a:tc>
+                <a:tc>
+                  <a:txBody>
+                    <a:bodyPr/>
+                    <a:lstStyle/>
+                    <a:p>
+                      <a:endParaRPr lang="en-US" sz="2400" dirty="0"/>
                     </a:p>
                   </a:txBody>
                   <a:tcPr/>
@@ -11140,7 +11223,7 @@
               <a:rPr lang="en-US" sz="1400" dirty="0">
                 <a:hlinkClick r:id="rId6"/>
               </a:rPr>
-              <a:t>Artifact Review and Badging</a:t>
+              <a:t>Artifact Review and Badging (Version 1.1)</a:t>
             </a:r>
             <a:r>
               <a:rPr lang="en-US" sz="1400" dirty="0"/>

</xml_diff>

<commit_message>
fix typo, clarify a point
thanks @darko-marinov
</commit_message>
<xml_diff>
--- a/Computational_Reproducibility.pptx
+++ b/Computational_Reproducibility.pptx
@@ -239,7 +239,7 @@
           <a:p>
             <a:fld id="{81C38738-6EB7-A34B-945D-F5A341E4EF53}" type="datetimeFigureOut">
               <a:rPr lang="en-US" smtClean="0"/>
-              <a:t>8/4/21</a:t>
+              <a:t>9/13/21</a:t>
             </a:fld>
             <a:endParaRPr lang="en-US"/>
           </a:p>
@@ -8311,7 +8311,7 @@
             <a:pPr lvl="1"/>
             <a:r>
               <a:rPr lang="en-US" sz="2000" dirty="0"/>
-              <a:t>To specific an environment</a:t>
+              <a:t>To specify an environment</a:t>
             </a:r>
           </a:p>
           <a:p>
@@ -8588,7 +8588,7 @@
             <a:pPr lvl="1"/>
             <a:r>
               <a:rPr lang="en-US" dirty="0"/>
-              <a:t>Common in the US and in universities, but students own work they develop, even in their own coursework</a:t>
+              <a:t>Common in the US and in universities, but students own work they develop in their own coursework (though not if they are paid to do it, such as in a research assistantship)</a:t>
             </a:r>
           </a:p>
           <a:p>

</xml_diff>